<commit_message>
Corrected readme last slide.
Typo
</commit_message>
<xml_diff>
--- a/docs/GenevaERS and Spark POC.pptx
+++ b/docs/GenevaERS and Spark POC.pptx
@@ -12976,15 +12976,7 @@
             </a:r>
             <a:r>
               <a:rPr lang="en-US" sz="2000" dirty="0"/>
-              <a:t> is designed to resolve all processes in a single pass of the transaction file.  In most cases </a:t>
-            </a:r>
-            <a:r>
-              <a:rPr lang="en-US" sz="2000"/>
-              <a:t>the system </a:t>
-            </a:r>
-            <a:r>
-              <a:rPr lang="en-US" sz="2000" dirty="0"/>
-              <a:t>is constructed with pre-determined partitioning schemes.  Thus GenevaERS makes </a:t>
+              <a:t> is designed to resolve all processes in a single pass of the transaction file.  In most cases the system is constructed with pre-determined partitioning schemes.  Thus GenevaERS makes </a:t>
             </a:r>
             <a:r>
               <a:rPr lang="en-US" sz="2000" dirty="0">

</xml_diff>